<commit_message>
fix a few typos
</commit_message>
<xml_diff>
--- a/src/pages/en/events/2024-09-13/slides/01_basics_en.pptx
+++ b/src/pages/en/events/2024-09-13/slides/01_basics_en.pptx
@@ -23818,8 +23818,12 @@
               <a:rPr lang="en-US" altLang="ja-JP" dirty="0"/>
             </a:br>
             <a:r>
+              <a:rPr lang="en-US" altLang="ja-JP"/>
+              <a:t>Also </a:t>
+            </a:r>
+            <a:r>
               <a:rPr lang="en-US" altLang="ja-JP" dirty="0"/>
-              <a:t>As known as single sign-on (SSO).</a:t>
+              <a:t>known as single sign-on (SSO).</a:t>
             </a:r>
           </a:p>
         </p:txBody>
@@ -24530,17 +24534,6 @@
 </file>
 
 <file path=customXml/item2.xml><?xml version="1.0" encoding="utf-8"?>
-<p:properties xmlns:p="http://schemas.microsoft.com/office/2006/metadata/properties" xmlns:xsi="http://www.w3.org/2001/XMLSchema-instance" xmlns:pc="http://schemas.microsoft.com/office/infopath/2007/PartnerControls">
-  <documentManagement>
-    <TaxCatchAll xmlns="334cf2e0-0245-4f40-82a3-a831e5e7775a" xsi:nil="true"/>
-    <lcf76f155ced4ddcb4097134ff3c332f xmlns="d89fd5b0-f297-46a7-8c43-79b7b7b34272">
-      <Terms xmlns="http://schemas.microsoft.com/office/infopath/2007/PartnerControls"/>
-    </lcf76f155ced4ddcb4097134ff3c332f>
-  </documentManagement>
-</p:properties>
-</file>
-
-<file path=customXml/item3.xml><?xml version="1.0" encoding="utf-8"?>
 <ct:contentTypeSchema xmlns:ct="http://schemas.microsoft.com/office/2006/metadata/contentType" xmlns:ma="http://schemas.microsoft.com/office/2006/metadata/properties/metaAttributes" ct:_="" ma:_="" ma:contentTypeName="ドキュメント" ma:contentTypeID="0x010100BC2807EFFEAAE646B3C72679374A27AD" ma:contentTypeVersion="16" ma:contentTypeDescription="新しいドキュメントを作成します。" ma:contentTypeScope="" ma:versionID="fc2dabbf376b68d69de6d8a4d9b1094b">
   <xsd:schema xmlns:xsd="http://www.w3.org/2001/XMLSchema" xmlns:xs="http://www.w3.org/2001/XMLSchema" xmlns:p="http://schemas.microsoft.com/office/2006/metadata/properties" xmlns:ns2="d89fd5b0-f297-46a7-8c43-79b7b7b34272" xmlns:ns3="334cf2e0-0245-4f40-82a3-a831e5e7775a" targetNamespace="http://schemas.microsoft.com/office/2006/metadata/properties" ma:root="true" ma:fieldsID="2af6a43cef02a594c9bf66487b64536d" ns2:_="" ns3:_="">
     <xsd:import namespace="d89fd5b0-f297-46a7-8c43-79b7b7b34272"/>
@@ -24783,6 +24776,17 @@
 </ct:contentTypeSchema>
 </file>
 
+<file path=customXml/item3.xml><?xml version="1.0" encoding="utf-8"?>
+<p:properties xmlns:p="http://schemas.microsoft.com/office/2006/metadata/properties" xmlns:xsi="http://www.w3.org/2001/XMLSchema-instance" xmlns:pc="http://schemas.microsoft.com/office/infopath/2007/PartnerControls">
+  <documentManagement>
+    <TaxCatchAll xmlns="334cf2e0-0245-4f40-82a3-a831e5e7775a" xsi:nil="true"/>
+    <lcf76f155ced4ddcb4097134ff3c332f xmlns="d89fd5b0-f297-46a7-8c43-79b7b7b34272">
+      <Terms xmlns="http://schemas.microsoft.com/office/infopath/2007/PartnerControls"/>
+    </lcf76f155ced4ddcb4097134ff3c332f>
+  </documentManagement>
+</p:properties>
+</file>
+
 <file path=customXml/itemProps1.xml><?xml version="1.0" encoding="utf-8"?>
 <ds:datastoreItem xmlns:ds="http://schemas.openxmlformats.org/officeDocument/2006/customXml" ds:itemID="{6130639F-8A0E-4631-BB2C-1307E9C18413}">
   <ds:schemaRefs>
@@ -24792,23 +24796,6 @@
 </file>
 
 <file path=customXml/itemProps2.xml><?xml version="1.0" encoding="utf-8"?>
-<ds:datastoreItem xmlns:ds="http://schemas.openxmlformats.org/officeDocument/2006/customXml" ds:itemID="{613B5A8C-C2D2-4C49-A03B-B41437F9A3AD}">
-  <ds:schemaRefs>
-    <ds:schemaRef ds:uri="http://schemas.microsoft.com/office/2006/metadata/properties"/>
-    <ds:schemaRef ds:uri="http://schemas.microsoft.com/office/2006/documentManagement/types"/>
-    <ds:schemaRef ds:uri="http://schemas.openxmlformats.org/package/2006/metadata/core-properties"/>
-    <ds:schemaRef ds:uri="d89fd5b0-f297-46a7-8c43-79b7b7b34272"/>
-    <ds:schemaRef ds:uri="http://purl.org/dc/elements/1.1/"/>
-    <ds:schemaRef ds:uri="http://schemas.microsoft.com/office/infopath/2007/PartnerControls"/>
-    <ds:schemaRef ds:uri="http://purl.org/dc/terms/"/>
-    <ds:schemaRef ds:uri="334cf2e0-0245-4f40-82a3-a831e5e7775a"/>
-    <ds:schemaRef ds:uri="http://www.w3.org/XML/1998/namespace"/>
-    <ds:schemaRef ds:uri="http://purl.org/dc/dcmitype/"/>
-  </ds:schemaRefs>
-</ds:datastoreItem>
-</file>
-
-<file path=customXml/itemProps3.xml><?xml version="1.0" encoding="utf-8"?>
 <ds:datastoreItem xmlns:ds="http://schemas.openxmlformats.org/officeDocument/2006/customXml" ds:itemID="{A7414E48-332D-4182-B29E-4EBD598408FC}">
   <ds:schemaRefs>
     <ds:schemaRef ds:uri="http://schemas.microsoft.com/office/2006/metadata/contentType"/>
@@ -24825,4 +24812,21 @@
     <ds:schemaRef ds:uri="http://schemas.microsoft.com/internal/obd"/>
   </ds:schemaRefs>
 </ds:datastoreItem>
+</file>
+
+<file path=customXml/itemProps3.xml><?xml version="1.0" encoding="utf-8"?>
+<ds:datastoreItem xmlns:ds="http://schemas.openxmlformats.org/officeDocument/2006/customXml" ds:itemID="{613B5A8C-C2D2-4C49-A03B-B41437F9A3AD}">
+  <ds:schemaRefs>
+    <ds:schemaRef ds:uri="http://schemas.microsoft.com/office/2006/metadata/properties"/>
+    <ds:schemaRef ds:uri="http://schemas.microsoft.com/office/2006/documentManagement/types"/>
+    <ds:schemaRef ds:uri="http://schemas.openxmlformats.org/package/2006/metadata/core-properties"/>
+    <ds:schemaRef ds:uri="d89fd5b0-f297-46a7-8c43-79b7b7b34272"/>
+    <ds:schemaRef ds:uri="http://purl.org/dc/elements/1.1/"/>
+    <ds:schemaRef ds:uri="http://schemas.microsoft.com/office/infopath/2007/PartnerControls"/>
+    <ds:schemaRef ds:uri="http://purl.org/dc/terms/"/>
+    <ds:schemaRef ds:uri="334cf2e0-0245-4f40-82a3-a831e5e7775a"/>
+    <ds:schemaRef ds:uri="http://www.w3.org/XML/1998/namespace"/>
+    <ds:schemaRef ds:uri="http://purl.org/dc/dcmitype/"/>
+  </ds:schemaRefs>
+</ds:datastoreItem>
 </file>
</xml_diff>

<commit_message>
fix link to principles and objectives
</commit_message>
<xml_diff>
--- a/src/pages/en/events/2024-09-13/slides/01_basics_en.pptx
+++ b/src/pages/en/events/2024-09-13/slides/01_basics_en.pptx
@@ -1996,7 +1996,7 @@
           <a:p>
             <a:fld id="{CB1A4338-2B97-43C1-AE79-82EAB43E70B8}" type="datetimeFigureOut">
               <a:rPr kumimoji="1" lang="ja-JP" altLang="en-US" smtClean="0"/>
-              <a:t>2024/9/12</a:t>
+              <a:t>2024/9/13</a:t>
             </a:fld>
             <a:endParaRPr kumimoji="1" lang="ja-JP" altLang="en-US"/>
           </a:p>
@@ -7039,8 +7039,8 @@
         </p:nvSpPr>
         <p:spPr>
           <a:xfrm>
-            <a:off x="2880000" y="3384525"/>
-            <a:ext cx="3600000" cy="576000"/>
+            <a:off x="2886725" y="4537440"/>
+            <a:ext cx="4071636" cy="576000"/>
           </a:xfrm>
           <a:prstGeom prst="roundRect">
             <a:avLst/>

</xml_diff>

<commit_message>
commit a forgotten change
</commit_message>
<xml_diff>
--- a/src/pages/en/events/2024-09-13/slides/01_basics_en.pptx
+++ b/src/pages/en/events/2024-09-13/slides/01_basics_en.pptx
@@ -20037,15 +20037,22 @@
           <a:p>
             <a:r>
               <a:rPr lang="en-US" altLang="ja-JP" dirty="0"/>
-              <a:t>Even if you use it on </a:t>
-            </a:r>
-            <a:r>
-              <a:rPr lang="en-US" altLang="ja-JP" dirty="0" err="1"/>
-              <a:t>UTokyo</a:t>
-            </a:r>
+              <a:t>Connected as external network</a:t>
+            </a:r>
+          </a:p>
+          <a:p>
+            <a:pPr lvl="1"/>
             <a:r>
               <a:rPr lang="en-US" altLang="ja-JP" dirty="0"/>
-              <a:t> campuses, you cannot access to resources limited to on-campus network.</a:t>
+              <a:t>Even if </a:t>
+            </a:r>
+            <a:r>
+              <a:rPr lang="en-US" altLang="ja-JP"/>
+              <a:t>you in UTokyo campus, </a:t>
+            </a:r>
+            <a:r>
+              <a:rPr lang="en-US" altLang="ja-JP" dirty="0"/>
+              <a:t>you cannot access to resources limited to on-campus network.</a:t>
             </a:r>
           </a:p>
           <a:p>
@@ -24525,15 +24532,6 @@
 </file>
 
 <file path=customXml/item1.xml><?xml version="1.0" encoding="utf-8"?>
-<?mso-contentType ?>
-<FormTemplates xmlns="http://schemas.microsoft.com/sharepoint/v3/contenttype/forms">
-  <Display>DocumentLibraryForm</Display>
-  <Edit>DocumentLibraryForm</Edit>
-  <New>DocumentLibraryForm</New>
-</FormTemplates>
-</file>
-
-<file path=customXml/item2.xml><?xml version="1.0" encoding="utf-8"?>
 <ct:contentTypeSchema xmlns:ct="http://schemas.microsoft.com/office/2006/metadata/contentType" xmlns:ma="http://schemas.microsoft.com/office/2006/metadata/properties/metaAttributes" ct:_="" ma:_="" ma:contentTypeName="ドキュメント" ma:contentTypeID="0x010100BC2807EFFEAAE646B3C72679374A27AD" ma:contentTypeVersion="16" ma:contentTypeDescription="新しいドキュメントを作成します。" ma:contentTypeScope="" ma:versionID="fc2dabbf376b68d69de6d8a4d9b1094b">
   <xsd:schema xmlns:xsd="http://www.w3.org/2001/XMLSchema" xmlns:xs="http://www.w3.org/2001/XMLSchema" xmlns:p="http://schemas.microsoft.com/office/2006/metadata/properties" xmlns:ns2="d89fd5b0-f297-46a7-8c43-79b7b7b34272" xmlns:ns3="334cf2e0-0245-4f40-82a3-a831e5e7775a" targetNamespace="http://schemas.microsoft.com/office/2006/metadata/properties" ma:root="true" ma:fieldsID="2af6a43cef02a594c9bf66487b64536d" ns2:_="" ns3:_="">
     <xsd:import namespace="d89fd5b0-f297-46a7-8c43-79b7b7b34272"/>
@@ -24776,6 +24774,15 @@
 </ct:contentTypeSchema>
 </file>
 
+<file path=customXml/item2.xml><?xml version="1.0" encoding="utf-8"?>
+<?mso-contentType ?>
+<FormTemplates xmlns="http://schemas.microsoft.com/sharepoint/v3/contenttype/forms">
+  <Display>DocumentLibraryForm</Display>
+  <Edit>DocumentLibraryForm</Edit>
+  <New>DocumentLibraryForm</New>
+</FormTemplates>
+</file>
+
 <file path=customXml/item3.xml><?xml version="1.0" encoding="utf-8"?>
 <p:properties xmlns:p="http://schemas.microsoft.com/office/2006/metadata/properties" xmlns:xsi="http://www.w3.org/2001/XMLSchema-instance" xmlns:pc="http://schemas.microsoft.com/office/infopath/2007/PartnerControls">
   <documentManagement>
@@ -24788,14 +24795,6 @@
 </file>
 
 <file path=customXml/itemProps1.xml><?xml version="1.0" encoding="utf-8"?>
-<ds:datastoreItem xmlns:ds="http://schemas.openxmlformats.org/officeDocument/2006/customXml" ds:itemID="{6130639F-8A0E-4631-BB2C-1307E9C18413}">
-  <ds:schemaRefs>
-    <ds:schemaRef ds:uri="http://schemas.microsoft.com/sharepoint/v3/contenttype/forms"/>
-  </ds:schemaRefs>
-</ds:datastoreItem>
-</file>
-
-<file path=customXml/itemProps2.xml><?xml version="1.0" encoding="utf-8"?>
 <ds:datastoreItem xmlns:ds="http://schemas.openxmlformats.org/officeDocument/2006/customXml" ds:itemID="{A7414E48-332D-4182-B29E-4EBD598408FC}">
   <ds:schemaRefs>
     <ds:schemaRef ds:uri="http://schemas.microsoft.com/office/2006/metadata/contentType"/>
@@ -24810,6 +24809,14 @@
     <ds:schemaRef ds:uri="http://purl.org/dc/elements/1.1/"/>
     <ds:schemaRef ds:uri="http://purl.org/dc/terms/"/>
     <ds:schemaRef ds:uri="http://schemas.microsoft.com/internal/obd"/>
+  </ds:schemaRefs>
+</ds:datastoreItem>
+</file>
+
+<file path=customXml/itemProps2.xml><?xml version="1.0" encoding="utf-8"?>
+<ds:datastoreItem xmlns:ds="http://schemas.openxmlformats.org/officeDocument/2006/customXml" ds:itemID="{6130639F-8A0E-4631-BB2C-1307E9C18413}">
+  <ds:schemaRefs>
+    <ds:schemaRef ds:uri="http://schemas.microsoft.com/sharepoint/v3/contenttype/forms"/>
   </ds:schemaRefs>
 </ds:datastoreItem>
 </file>

</xml_diff>